<commit_message>
fixed pptx devoir 3
</commit_message>
<xml_diff>
--- a/devoir_3/doc/MEC8211 Devoir 3 - 2280971-2289622-2302784.pptx
+++ b/devoir_3/doc/MEC8211 Devoir 3 - 2280971-2289622-2302784.pptx
@@ -213,7 +213,7 @@
           <a:p>
             <a:fld id="{A6795158-02DB-43FB-9485-C9DE73DE9D3B}" type="datetimeFigureOut">
               <a:rPr lang="en-CA" smtClean="0"/>
-              <a:t>2024-03-22</a:t>
+              <a:t>2024-03-25</a:t>
             </a:fld>
             <a:endParaRPr lang="en-CA"/>
           </a:p>
@@ -1470,7 +1470,7 @@
           <a:p>
             <a:fld id="{C2FFAD46-150B-4C63-AC74-1DD194403433}" type="datetime1">
               <a:rPr lang="en-CA" smtClean="0"/>
-              <a:t>2024-03-22</a:t>
+              <a:t>2024-03-25</a:t>
             </a:fld>
             <a:endParaRPr lang="en-CA"/>
           </a:p>
@@ -1670,7 +1670,7 @@
           <a:p>
             <a:fld id="{BFC4FA3B-B9E6-4CA3-9359-7628F8D70AE2}" type="datetime1">
               <a:rPr lang="en-CA" smtClean="0"/>
-              <a:t>2024-03-22</a:t>
+              <a:t>2024-03-25</a:t>
             </a:fld>
             <a:endParaRPr lang="en-CA"/>
           </a:p>
@@ -1880,7 +1880,7 @@
           <a:p>
             <a:fld id="{04DC2123-720E-4B60-92C6-F7AB9E2A7062}" type="datetime1">
               <a:rPr lang="en-CA" smtClean="0"/>
-              <a:t>2024-03-22</a:t>
+              <a:t>2024-03-25</a:t>
             </a:fld>
             <a:endParaRPr lang="en-CA"/>
           </a:p>
@@ -2080,7 +2080,7 @@
           <a:p>
             <a:fld id="{D8E53C4D-098F-4CE2-B935-A92185344392}" type="datetime1">
               <a:rPr lang="en-CA" smtClean="0"/>
-              <a:t>2024-03-22</a:t>
+              <a:t>2024-03-25</a:t>
             </a:fld>
             <a:endParaRPr lang="en-CA"/>
           </a:p>
@@ -2356,7 +2356,7 @@
           <a:p>
             <a:fld id="{89E5B83E-C678-43C4-9509-ADBBE6D0B6F5}" type="datetime1">
               <a:rPr lang="en-CA" smtClean="0"/>
-              <a:t>2024-03-22</a:t>
+              <a:t>2024-03-25</a:t>
             </a:fld>
             <a:endParaRPr lang="en-CA"/>
           </a:p>
@@ -2624,7 +2624,7 @@
           <a:p>
             <a:fld id="{A9A61577-AC9B-491E-8441-19DF825A5732}" type="datetime1">
               <a:rPr lang="en-CA" smtClean="0"/>
-              <a:t>2024-03-22</a:t>
+              <a:t>2024-03-25</a:t>
             </a:fld>
             <a:endParaRPr lang="en-CA"/>
           </a:p>
@@ -3039,7 +3039,7 @@
           <a:p>
             <a:fld id="{5D0A112C-C77B-44A9-9450-6B46538110DB}" type="datetime1">
               <a:rPr lang="en-CA" smtClean="0"/>
-              <a:t>2024-03-22</a:t>
+              <a:t>2024-03-25</a:t>
             </a:fld>
             <a:endParaRPr lang="en-CA"/>
           </a:p>
@@ -3181,7 +3181,7 @@
           <a:p>
             <a:fld id="{B71B1A08-6110-4555-82B8-BF6EC2156BA6}" type="datetime1">
               <a:rPr lang="en-CA" smtClean="0"/>
-              <a:t>2024-03-22</a:t>
+              <a:t>2024-03-25</a:t>
             </a:fld>
             <a:endParaRPr lang="en-CA"/>
           </a:p>
@@ -3294,7 +3294,7 @@
           <a:p>
             <a:fld id="{8ADFB507-16DA-4C93-A478-91BF27FDBABD}" type="datetime1">
               <a:rPr lang="en-CA" smtClean="0"/>
-              <a:t>2024-03-22</a:t>
+              <a:t>2024-03-25</a:t>
             </a:fld>
             <a:endParaRPr lang="en-CA"/>
           </a:p>
@@ -3607,7 +3607,7 @@
           <a:p>
             <a:fld id="{8D444A8B-45FC-4F79-88DF-CEA443530C68}" type="datetime1">
               <a:rPr lang="en-CA" smtClean="0"/>
-              <a:t>2024-03-22</a:t>
+              <a:t>2024-03-25</a:t>
             </a:fld>
             <a:endParaRPr lang="en-CA"/>
           </a:p>
@@ -3896,7 +3896,7 @@
           <a:p>
             <a:fld id="{FA42A9C8-34D7-49A2-9172-5F37AD1760C8}" type="datetime1">
               <a:rPr lang="en-CA" smtClean="0"/>
-              <a:t>2024-03-22</a:t>
+              <a:t>2024-03-25</a:t>
             </a:fld>
             <a:endParaRPr lang="en-CA"/>
           </a:p>
@@ -4139,7 +4139,7 @@
           <a:p>
             <a:fld id="{BF2629EA-3D8D-48CD-81EE-0C7D1817282D}" type="datetime1">
               <a:rPr lang="en-CA" smtClean="0"/>
-              <a:t>2024-03-22</a:t>
+              <a:t>2024-03-25</a:t>
             </a:fld>
             <a:endParaRPr lang="en-CA"/>
           </a:p>
@@ -5114,8 +5114,8 @@
           </a:prstGeom>
         </p:spPr>
       </p:pic>
-      <mc:AlternateContent xmlns:mc="http://schemas.openxmlformats.org/markup-compatibility/2006">
-        <mc:Choice xmlns:a14="http://schemas.microsoft.com/office/drawing/2010/main" Requires="a14">
+      <mc:AlternateContent xmlns:mc="http://schemas.openxmlformats.org/markup-compatibility/2006" xmlns:a14="http://schemas.microsoft.com/office/drawing/2010/main">
+        <mc:Choice Requires="a14">
           <p:sp>
             <p:nvSpPr>
               <p:cNvPr id="14" name="TextBox 13">
@@ -5762,7 +5762,7 @@
             </p:txBody>
           </p:sp>
         </mc:Choice>
-        <mc:Fallback>
+        <mc:Fallback xmlns="">
           <p:sp>
             <p:nvSpPr>
               <p:cNvPr id="14" name="TextBox 13">
@@ -5872,8 +5872,8 @@
           <a:chExt cx="0" cy="0"/>
         </a:xfrm>
       </p:grpSpPr>
-      <mc:AlternateContent xmlns:mc="http://schemas.openxmlformats.org/markup-compatibility/2006">
-        <mc:Choice xmlns:a14="http://schemas.microsoft.com/office/drawing/2010/main" Requires="a14">
+      <mc:AlternateContent xmlns:mc="http://schemas.openxmlformats.org/markup-compatibility/2006" xmlns:a14="http://schemas.microsoft.com/office/drawing/2010/main">
+        <mc:Choice Requires="a14">
           <p:sp>
             <p:nvSpPr>
               <p:cNvPr id="29" name="TextBox 28">
@@ -5955,21 +5955,7 @@
                           <m:nor/>
                         </m:rPr>
                         <a:rPr lang="en-CA" sz="1400" i="1" dirty="0" smtClean="0"/>
-                        <m:t>0</m:t>
-                      </m:r>
-                      <m:r>
-                        <m:rPr>
-                          <m:nor/>
-                        </m:rPr>
-                        <a:rPr lang="en-CA" sz="1400" i="1" dirty="0" smtClean="0"/>
-                        <m:t>.</m:t>
-                      </m:r>
-                      <m:r>
-                        <m:rPr>
-                          <m:nor/>
-                        </m:rPr>
-                        <a:rPr lang="en-CA" sz="1400" i="1" dirty="0" smtClean="0"/>
-                        <m:t>249892125940451</m:t>
+                        <m:t>0.249892125940451</m:t>
                       </m:r>
                     </m:oMath>
                   </m:oMathPara>
@@ -6051,13 +6037,7 @@
                         <a:rPr lang="en-CA" sz="1400" b="0" i="1" smtClean="0">
                           <a:latin typeface="Cambria Math" panose="02040503050406030204" pitchFamily="18" charset="0"/>
                         </a:rPr>
-                        <m:t>/</m:t>
-                      </m:r>
-                      <m:r>
-                        <a:rPr lang="en-CA" sz="1400" b="0" i="1" smtClean="0">
-                          <a:latin typeface="Cambria Math" panose="02040503050406030204" pitchFamily="18" charset="0"/>
-                        </a:rPr>
-                        <m:t>2</m:t>
+                        <m:t>/2</m:t>
                       </m:r>
                     </m:oMath>
                   </m:oMathPara>
@@ -6112,21 +6092,7 @@
                           <m:nor/>
                         </m:rPr>
                         <a:rPr lang="en-CA" sz="1400" i="1" dirty="0" smtClean="0"/>
-                        <m:t>0</m:t>
-                      </m:r>
-                      <m:r>
-                        <m:rPr>
-                          <m:nor/>
-                        </m:rPr>
-                        <a:rPr lang="en-CA" sz="1400" i="1" dirty="0" smtClean="0"/>
-                        <m:t>.</m:t>
-                      </m:r>
-                      <m:r>
-                        <m:rPr>
-                          <m:nor/>
-                        </m:rPr>
-                        <a:rPr lang="en-CA" sz="1400" i="1" dirty="0" smtClean="0"/>
-                        <m:t>124946062970225</m:t>
+                        <m:t>0.124946062970225</m:t>
                       </m:r>
                     </m:oMath>
                   </m:oMathPara>
@@ -6136,7 +6102,7 @@
             </p:txBody>
           </p:sp>
         </mc:Choice>
-        <mc:Fallback>
+        <mc:Fallback xmlns="">
           <p:sp>
             <p:nvSpPr>
               <p:cNvPr id="29" name="TextBox 28">
@@ -6487,8 +6453,8 @@
             <a:chExt cx="11456616" cy="1861093"/>
           </a:xfrm>
         </p:grpSpPr>
-        <mc:AlternateContent xmlns:mc="http://schemas.openxmlformats.org/markup-compatibility/2006">
-          <mc:Choice xmlns:a14="http://schemas.microsoft.com/office/drawing/2010/main" Requires="a14">
+        <mc:AlternateContent xmlns:mc="http://schemas.openxmlformats.org/markup-compatibility/2006" xmlns:a14="http://schemas.microsoft.com/office/drawing/2010/main">
+          <mc:Choice Requires="a14">
             <p:sp>
               <p:nvSpPr>
                 <p:cNvPr id="20" name="TextBox 19">
@@ -7198,7 +7164,7 @@
               </p:txBody>
             </p:sp>
           </mc:Choice>
-          <mc:Fallback>
+          <mc:Fallback xmlns="">
             <p:sp>
               <p:nvSpPr>
                 <p:cNvPr id="20" name="TextBox 19">
@@ -7243,8 +7209,8 @@
             </p:sp>
           </mc:Fallback>
         </mc:AlternateContent>
-        <mc:AlternateContent xmlns:mc="http://schemas.openxmlformats.org/markup-compatibility/2006">
-          <mc:Choice xmlns:a14="http://schemas.microsoft.com/office/drawing/2010/main" Requires="a14">
+        <mc:AlternateContent xmlns:mc="http://schemas.openxmlformats.org/markup-compatibility/2006" xmlns:a14="http://schemas.microsoft.com/office/drawing/2010/main">
+          <mc:Choice Requires="a14">
             <p:sp>
               <p:nvSpPr>
                 <p:cNvPr id="22" name="TextBox 21">
@@ -7969,7 +7935,7 @@
               </p:txBody>
             </p:sp>
           </mc:Choice>
-          <mc:Fallback>
+          <mc:Fallback xmlns="">
             <p:sp>
               <p:nvSpPr>
                 <p:cNvPr id="22" name="TextBox 21">
@@ -8014,8 +7980,8 @@
             </p:sp>
           </mc:Fallback>
         </mc:AlternateContent>
-        <mc:AlternateContent xmlns:mc="http://schemas.openxmlformats.org/markup-compatibility/2006">
-          <mc:Choice xmlns:a14="http://schemas.microsoft.com/office/drawing/2010/main" Requires="a14">
+        <mc:AlternateContent xmlns:mc="http://schemas.openxmlformats.org/markup-compatibility/2006" xmlns:a14="http://schemas.microsoft.com/office/drawing/2010/main">
+          <mc:Choice Requires="a14">
             <p:sp>
               <p:nvSpPr>
                 <p:cNvPr id="23" name="TextBox 22">
@@ -8737,7 +8703,7 @@
               </p:txBody>
             </p:sp>
           </mc:Choice>
-          <mc:Fallback>
+          <mc:Fallback xmlns="">
             <p:sp>
               <p:nvSpPr>
                 <p:cNvPr id="23" name="TextBox 22">
@@ -8782,8 +8748,8 @@
             </p:sp>
           </mc:Fallback>
         </mc:AlternateContent>
-        <mc:AlternateContent xmlns:mc="http://schemas.openxmlformats.org/markup-compatibility/2006">
-          <mc:Choice xmlns:a14="http://schemas.microsoft.com/office/drawing/2010/main" Requires="a14">
+        <mc:AlternateContent xmlns:mc="http://schemas.openxmlformats.org/markup-compatibility/2006" xmlns:a14="http://schemas.microsoft.com/office/drawing/2010/main">
+          <mc:Choice Requires="a14">
             <p:sp>
               <p:nvSpPr>
                 <p:cNvPr id="24" name="TextBox 23">
@@ -9522,7 +9488,7 @@
               </p:txBody>
             </p:sp>
           </mc:Choice>
-          <mc:Fallback>
+          <mc:Fallback xmlns="">
             <p:sp>
               <p:nvSpPr>
                 <p:cNvPr id="24" name="TextBox 23">
@@ -9567,8 +9533,8 @@
             </p:sp>
           </mc:Fallback>
         </mc:AlternateContent>
-        <mc:AlternateContent xmlns:mc="http://schemas.openxmlformats.org/markup-compatibility/2006">
-          <mc:Choice xmlns:a14="http://schemas.microsoft.com/office/drawing/2010/main" Requires="a14">
+        <mc:AlternateContent xmlns:mc="http://schemas.openxmlformats.org/markup-compatibility/2006" xmlns:a14="http://schemas.microsoft.com/office/drawing/2010/main">
+          <mc:Choice Requires="a14">
             <p:sp>
               <p:nvSpPr>
                 <p:cNvPr id="25" name="TextBox 24">
@@ -10291,7 +10257,7 @@
               </p:txBody>
             </p:sp>
           </mc:Choice>
-          <mc:Fallback>
+          <mc:Fallback xmlns="">
             <p:sp>
               <p:nvSpPr>
                 <p:cNvPr id="25" name="TextBox 24">
@@ -10554,8 +10520,8 @@
           </a:prstGeom>
         </p:spPr>
       </p:pic>
-      <mc:AlternateContent xmlns:mc="http://schemas.openxmlformats.org/markup-compatibility/2006">
-        <mc:Choice xmlns:a14="http://schemas.microsoft.com/office/drawing/2010/main" Requires="a14">
+      <mc:AlternateContent xmlns:mc="http://schemas.openxmlformats.org/markup-compatibility/2006" xmlns:a14="http://schemas.microsoft.com/office/drawing/2010/main">
+        <mc:Choice Requires="a14">
           <p:sp>
             <p:nvSpPr>
               <p:cNvPr id="14" name="TextBox 13">
@@ -11142,7 +11108,7 @@
             </p:txBody>
           </p:sp>
         </mc:Choice>
-        <mc:Fallback>
+        <mc:Fallback xmlns="">
           <p:sp>
             <p:nvSpPr>
               <p:cNvPr id="14" name="TextBox 13">
@@ -11252,8 +11218,8 @@
           <a:chExt cx="0" cy="0"/>
         </a:xfrm>
       </p:grpSpPr>
-      <mc:AlternateContent xmlns:mc="http://schemas.openxmlformats.org/markup-compatibility/2006">
-        <mc:Choice xmlns:a14="http://schemas.microsoft.com/office/drawing/2010/main" Requires="a14">
+      <mc:AlternateContent xmlns:mc="http://schemas.openxmlformats.org/markup-compatibility/2006" xmlns:a14="http://schemas.microsoft.com/office/drawing/2010/main">
+        <mc:Choice Requires="a14">
           <p:sp>
             <p:nvSpPr>
               <p:cNvPr id="29" name="TextBox 28">
@@ -11562,7 +11528,7 @@
             </p:txBody>
           </p:sp>
         </mc:Choice>
-        <mc:Fallback>
+        <mc:Fallback xmlns="">
           <p:sp>
             <p:nvSpPr>
               <p:cNvPr id="29" name="TextBox 28">
@@ -12149,8 +12115,8 @@
           </a:prstGeom>
         </p:spPr>
       </p:pic>
-      <mc:AlternateContent xmlns:mc="http://schemas.openxmlformats.org/markup-compatibility/2006">
-        <mc:Choice xmlns:a14="http://schemas.microsoft.com/office/drawing/2010/main" Requires="a14">
+      <mc:AlternateContent xmlns:mc="http://schemas.openxmlformats.org/markup-compatibility/2006" xmlns:a14="http://schemas.microsoft.com/office/drawing/2010/main">
+        <mc:Choice Requires="a14">
           <p:sp>
             <p:nvSpPr>
               <p:cNvPr id="14" name="TextBox 13">
@@ -13656,13 +13622,7 @@
                         <a:rPr lang="en-CA" sz="1400" b="0" i="1" smtClean="0">
                           <a:latin typeface="Cambria Math" panose="02040503050406030204" pitchFamily="18" charset="0"/>
                         </a:rPr>
-                        <m:t>=</m:t>
-                      </m:r>
-                      <m:r>
-                        <a:rPr lang="en-CA" sz="1400" b="0" i="1" smtClean="0">
-                          <a:latin typeface="Cambria Math" panose="02040503050406030204" pitchFamily="18" charset="0"/>
-                        </a:rPr>
-                        <m:t>−</m:t>
+                        <m:t>=−</m:t>
                       </m:r>
                       <m:r>
                         <a:rPr lang="en-CA" sz="1400" b="0" i="1" smtClean="0">
@@ -13734,19 +13694,7 @@
                         <a:rPr lang="en-CA" sz="1400" b="0" i="1" smtClean="0">
                           <a:latin typeface="Cambria Math" panose="02040503050406030204" pitchFamily="18" charset="0"/>
                         </a:rPr>
-                        <m:t>&amp;</m:t>
-                      </m:r>
-                      <m:r>
-                        <a:rPr lang="en-CA" sz="1400" b="0" i="1" smtClean="0">
-                          <a:latin typeface="Cambria Math" panose="02040503050406030204" pitchFamily="18" charset="0"/>
-                        </a:rPr>
-                        <m:t> </m:t>
-                      </m:r>
-                      <m:r>
-                        <a:rPr lang="en-CA" sz="1400" b="0" i="1" smtClean="0">
-                          <a:latin typeface="Cambria Math" panose="02040503050406030204" pitchFamily="18" charset="0"/>
-                        </a:rPr>
-                        <m:t>  </m:t>
+                        <m:t>&amp;   </m:t>
                       </m:r>
                       <m:sSub>
                         <m:sSubPr>
@@ -13872,7 +13820,7 @@
             </p:txBody>
           </p:sp>
         </mc:Choice>
-        <mc:Fallback>
+        <mc:Fallback xmlns="">
           <p:sp>
             <p:nvSpPr>
               <p:cNvPr id="14" name="TextBox 13">
@@ -14082,8 +14030,8 @@
           </a:prstGeom>
         </p:spPr>
       </p:pic>
-      <mc:AlternateContent xmlns:mc="http://schemas.openxmlformats.org/markup-compatibility/2006">
-        <mc:Choice xmlns:a14="http://schemas.microsoft.com/office/drawing/2010/main" Requires="a14">
+      <mc:AlternateContent xmlns:mc="http://schemas.openxmlformats.org/markup-compatibility/2006" xmlns:a14="http://schemas.microsoft.com/office/drawing/2010/main">
+        <mc:Choice Requires="a14">
           <p:sp>
             <p:nvSpPr>
               <p:cNvPr id="14" name="TextBox 13">
@@ -14327,7 +14275,7 @@
             </p:txBody>
           </p:sp>
         </mc:Choice>
-        <mc:Fallback>
+        <mc:Fallback xmlns="">
           <p:sp>
             <p:nvSpPr>
               <p:cNvPr id="14" name="TextBox 13">
@@ -14553,8 +14501,8 @@
           </a:prstGeom>
         </p:spPr>
       </p:pic>
-      <mc:AlternateContent xmlns:mc="http://schemas.openxmlformats.org/markup-compatibility/2006">
-        <mc:Choice xmlns:a14="http://schemas.microsoft.com/office/drawing/2010/main" Requires="a14">
+      <mc:AlternateContent xmlns:mc="http://schemas.openxmlformats.org/markup-compatibility/2006" xmlns:a14="http://schemas.microsoft.com/office/drawing/2010/main">
+        <mc:Choice Requires="a14">
           <p:sp>
             <p:nvSpPr>
               <p:cNvPr id="14" name="TextBox 13">
@@ -15639,7 +15587,7 @@
             </p:txBody>
           </p:sp>
         </mc:Choice>
-        <mc:Fallback>
+        <mc:Fallback xmlns="">
           <p:sp>
             <p:nvSpPr>
               <p:cNvPr id="14" name="TextBox 13">
@@ -15820,35 +15768,6 @@
           </a:prstGeom>
         </p:spPr>
       </p:pic>
-      <p:sp>
-        <p:nvSpPr>
-          <p:cNvPr id="3" name="Slide Number Placeholder 2">
-            <a:extLst>
-              <a:ext uri="{FF2B5EF4-FFF2-40B4-BE49-F238E27FC236}">
-                <a16:creationId xmlns:a16="http://schemas.microsoft.com/office/drawing/2014/main" id="{711D32D6-F6DB-A4D5-4663-C6251CDC2E92}"/>
-              </a:ext>
-            </a:extLst>
-          </p:cNvPr>
-          <p:cNvSpPr>
-            <a:spLocks noGrp="1"/>
-          </p:cNvSpPr>
-          <p:nvPr>
-            <p:ph type="sldNum" sz="quarter" idx="12"/>
-          </p:nvPr>
-        </p:nvSpPr>
-        <p:spPr/>
-        <p:txBody>
-          <a:bodyPr/>
-          <a:lstStyle/>
-          <a:p>
-            <a:fld id="{39C1223B-8CCF-4977-9E71-76A2BF368F2A}" type="slidenum">
-              <a:rPr lang="en-CA" smtClean="0"/>
-              <a:t>9</a:t>
-            </a:fld>
-            <a:endParaRPr lang="en-CA"/>
-          </a:p>
-        </p:txBody>
-      </p:sp>
     </p:spTree>
     <p:extLst>
       <p:ext uri="{BB962C8B-B14F-4D97-AF65-F5344CB8AC3E}">

</xml_diff>